<commit_message>
attempt to fix github problems
</commit_message>
<xml_diff>
--- a/wireframe template.pptx
+++ b/wireframe template.pptx
@@ -104,6 +104,11 @@
       </a:defRPr>
     </a:lvl9pPr>
   </p:defaultTextStyle>
+  <p:extLst>
+    <p:ext uri="{EFAFB233-063F-42B5-8137-9DF3F51BA10A}">
+      <p15:sldGuideLst xmlns:p15="http://schemas.microsoft.com/office/powerpoint/2012/main"/>
+    </p:ext>
+  </p:extLst>
 </p:presentation>
 </file>
 
@@ -2950,6 +2955,14 @@
 <file path=ppt/slides/slide1.xml><?xml version="1.0" encoding="utf-8"?>
 <p:sld xmlns:a="http://schemas.openxmlformats.org/drawingml/2006/main" xmlns:r="http://schemas.openxmlformats.org/officeDocument/2006/relationships" xmlns:p="http://schemas.openxmlformats.org/presentationml/2006/main">
   <p:cSld>
+    <p:bg>
+      <p:bgPr>
+        <a:solidFill>
+          <a:srgbClr val="FFEBBE"/>
+        </a:solidFill>
+        <a:effectLst/>
+      </p:bgPr>
+    </p:bg>
     <p:spTree>
       <p:nvGrpSpPr>
         <p:cNvPr id="1" name=""/>
@@ -2993,6 +3006,1081 @@
                 </a:schemeClr>
               </a:solidFill>
             </a:endParaRPr>
+          </a:p>
+        </p:txBody>
+      </p:sp>
+      <p:sp>
+        <p:nvSpPr>
+          <p:cNvPr id="2" name="TextBox 1"/>
+          <p:cNvSpPr txBox="1"/>
+          <p:nvPr/>
+        </p:nvSpPr>
+        <p:spPr>
+          <a:xfrm>
+            <a:off x="828675" y="100013"/>
+            <a:ext cx="10372725" cy="6757987"/>
+          </a:xfrm>
+          <a:prstGeom prst="rect">
+            <a:avLst/>
+          </a:prstGeom>
+          <a:noFill/>
+        </p:spPr>
+        <p:style>
+          <a:lnRef idx="2">
+            <a:schemeClr val="dk1"/>
+          </a:lnRef>
+          <a:fillRef idx="1">
+            <a:schemeClr val="lt1"/>
+          </a:fillRef>
+          <a:effectRef idx="0">
+            <a:schemeClr val="dk1"/>
+          </a:effectRef>
+          <a:fontRef idx="minor">
+            <a:schemeClr val="dk1"/>
+          </a:fontRef>
+        </p:style>
+        <p:txBody>
+          <a:bodyPr wrap="square" rtlCol="0">
+            <a:spAutoFit/>
+          </a:bodyPr>
+          <a:lstStyle/>
+          <a:p>
+            <a:endParaRPr lang="en-US"/>
+          </a:p>
+        </p:txBody>
+      </p:sp>
+      <p:graphicFrame>
+        <p:nvGraphicFramePr>
+          <p:cNvPr id="5" name="Table 4"/>
+          <p:cNvGraphicFramePr>
+            <a:graphicFrameLocks noGrp="1"/>
+          </p:cNvGraphicFramePr>
+          <p:nvPr>
+            <p:extLst>
+              <p:ext uri="{D42A27DB-BD31-4B8C-83A1-F6EECF244321}">
+                <p14:modId xmlns:p14="http://schemas.microsoft.com/office/powerpoint/2010/main" val="1335794327"/>
+              </p:ext>
+            </p:extLst>
+          </p:nvPr>
+        </p:nvGraphicFramePr>
+        <p:xfrm>
+          <a:off x="1265955" y="146507"/>
+          <a:ext cx="9215442" cy="640080"/>
+        </p:xfrm>
+        <a:graphic>
+          <a:graphicData uri="http://schemas.openxmlformats.org/drawingml/2006/table">
+            <a:tbl>
+              <a:tblPr bandRow="1">
+                <a:tableStyleId>{E929F9F4-4A8F-4326-A1B4-22849713DDAB}</a:tableStyleId>
+              </a:tblPr>
+              <a:tblGrid>
+                <a:gridCol w="1535907"/>
+                <a:gridCol w="1535907"/>
+                <a:gridCol w="1535907"/>
+                <a:gridCol w="1535907"/>
+                <a:gridCol w="1535907"/>
+                <a:gridCol w="1535907"/>
+              </a:tblGrid>
+              <a:tr h="370840">
+                <a:tc>
+                  <a:txBody>
+                    <a:bodyPr/>
+                    <a:lstStyle/>
+                    <a:p>
+                      <a:r>
+                        <a:rPr lang="en-US" dirty="0" smtClean="0">
+                          <a:solidFill>
+                            <a:schemeClr val="tx1">
+                              <a:lumMod val="85000"/>
+                              <a:lumOff val="15000"/>
+                            </a:schemeClr>
+                          </a:solidFill>
+                        </a:rPr>
+                        <a:t>Sustainable Beekeeping</a:t>
+                      </a:r>
+                      <a:endParaRPr lang="en-US" dirty="0">
+                        <a:solidFill>
+                          <a:schemeClr val="tx1">
+                            <a:lumMod val="85000"/>
+                            <a:lumOff val="15000"/>
+                          </a:schemeClr>
+                        </a:solidFill>
+                      </a:endParaRPr>
+                    </a:p>
+                  </a:txBody>
+                  <a:tcPr>
+                    <a:blipFill dpi="0" rotWithShape="1">
+                      <a:blip r:embed="rId2">
+                        <a:extLst>
+                          <a:ext uri="{28A0092B-C50C-407E-A947-70E740481C1C}">
+                            <a14:useLocalDpi xmlns:a14="http://schemas.microsoft.com/office/drawing/2010/main" val="0"/>
+                          </a:ext>
+                        </a:extLst>
+                      </a:blip>
+                      <a:srcRect/>
+                      <a:tile tx="0" ty="0" sx="100000" sy="100000" flip="none" algn="ctr"/>
+                    </a:blipFill>
+                  </a:tcPr>
+                </a:tc>
+                <a:tc>
+                  <a:txBody>
+                    <a:bodyPr/>
+                    <a:lstStyle/>
+                    <a:p>
+                      <a:r>
+                        <a:rPr lang="en-US" dirty="0" smtClean="0">
+                          <a:solidFill>
+                            <a:schemeClr val="accent4">
+                              <a:lumMod val="75000"/>
+                            </a:schemeClr>
+                          </a:solidFill>
+                        </a:rPr>
+                        <a:t>Videos</a:t>
+                      </a:r>
+                      <a:endParaRPr lang="en-US" dirty="0">
+                        <a:solidFill>
+                          <a:schemeClr val="accent4">
+                            <a:lumMod val="75000"/>
+                          </a:schemeClr>
+                        </a:solidFill>
+                      </a:endParaRPr>
+                    </a:p>
+                  </a:txBody>
+                  <a:tcPr>
+                    <a:blipFill dpi="0" rotWithShape="1">
+                      <a:blip r:embed="rId2">
+                        <a:extLst>
+                          <a:ext uri="{28A0092B-C50C-407E-A947-70E740481C1C}">
+                            <a14:useLocalDpi xmlns:a14="http://schemas.microsoft.com/office/drawing/2010/main" val="0"/>
+                          </a:ext>
+                        </a:extLst>
+                      </a:blip>
+                      <a:srcRect/>
+                      <a:tile tx="0" ty="0" sx="100000" sy="100000" flip="none" algn="ctr"/>
+                    </a:blipFill>
+                  </a:tcPr>
+                </a:tc>
+                <a:tc>
+                  <a:txBody>
+                    <a:bodyPr/>
+                    <a:lstStyle/>
+                    <a:p>
+                      <a:r>
+                        <a:rPr lang="en-US" dirty="0" smtClean="0">
+                          <a:solidFill>
+                            <a:schemeClr val="accent4">
+                              <a:lumMod val="75000"/>
+                            </a:schemeClr>
+                          </a:solidFill>
+                        </a:rPr>
+                        <a:t>Articles</a:t>
+                      </a:r>
+                      <a:endParaRPr lang="en-US" dirty="0">
+                        <a:solidFill>
+                          <a:schemeClr val="accent4">
+                            <a:lumMod val="75000"/>
+                          </a:schemeClr>
+                        </a:solidFill>
+                      </a:endParaRPr>
+                    </a:p>
+                  </a:txBody>
+                  <a:tcPr>
+                    <a:blipFill dpi="0" rotWithShape="1">
+                      <a:blip r:embed="rId2">
+                        <a:extLst>
+                          <a:ext uri="{28A0092B-C50C-407E-A947-70E740481C1C}">
+                            <a14:useLocalDpi xmlns:a14="http://schemas.microsoft.com/office/drawing/2010/main" val="0"/>
+                          </a:ext>
+                        </a:extLst>
+                      </a:blip>
+                      <a:srcRect/>
+                      <a:tile tx="0" ty="0" sx="100000" sy="100000" flip="none" algn="ctr"/>
+                    </a:blipFill>
+                  </a:tcPr>
+                </a:tc>
+                <a:tc>
+                  <a:txBody>
+                    <a:bodyPr/>
+                    <a:lstStyle/>
+                    <a:p>
+                      <a:r>
+                        <a:rPr lang="en-US" dirty="0" smtClean="0">
+                          <a:solidFill>
+                            <a:schemeClr val="accent4">
+                              <a:lumMod val="75000"/>
+                            </a:schemeClr>
+                          </a:solidFill>
+                        </a:rPr>
+                        <a:t>Bee Calendar</a:t>
+                      </a:r>
+                      <a:endParaRPr lang="en-US" dirty="0">
+                        <a:solidFill>
+                          <a:schemeClr val="accent4">
+                            <a:lumMod val="75000"/>
+                          </a:schemeClr>
+                        </a:solidFill>
+                      </a:endParaRPr>
+                    </a:p>
+                  </a:txBody>
+                  <a:tcPr>
+                    <a:blipFill dpi="0" rotWithShape="1">
+                      <a:blip r:embed="rId2">
+                        <a:extLst>
+                          <a:ext uri="{28A0092B-C50C-407E-A947-70E740481C1C}">
+                            <a14:useLocalDpi xmlns:a14="http://schemas.microsoft.com/office/drawing/2010/main" val="0"/>
+                          </a:ext>
+                        </a:extLst>
+                      </a:blip>
+                      <a:srcRect/>
+                      <a:tile tx="0" ty="0" sx="100000" sy="100000" flip="none" algn="ctr"/>
+                    </a:blipFill>
+                  </a:tcPr>
+                </a:tc>
+                <a:tc>
+                  <a:txBody>
+                    <a:bodyPr/>
+                    <a:lstStyle/>
+                    <a:p>
+                      <a:r>
+                        <a:rPr lang="en-US" dirty="0" smtClean="0">
+                          <a:solidFill>
+                            <a:schemeClr val="accent4">
+                              <a:lumMod val="75000"/>
+                            </a:schemeClr>
+                          </a:solidFill>
+                        </a:rPr>
+                        <a:t>Honey</a:t>
+                      </a:r>
+                      <a:endParaRPr lang="en-US" dirty="0">
+                        <a:solidFill>
+                          <a:schemeClr val="accent4">
+                            <a:lumMod val="75000"/>
+                          </a:schemeClr>
+                        </a:solidFill>
+                      </a:endParaRPr>
+                    </a:p>
+                  </a:txBody>
+                  <a:tcPr>
+                    <a:blipFill dpi="0" rotWithShape="1">
+                      <a:blip r:embed="rId2">
+                        <a:extLst>
+                          <a:ext uri="{28A0092B-C50C-407E-A947-70E740481C1C}">
+                            <a14:useLocalDpi xmlns:a14="http://schemas.microsoft.com/office/drawing/2010/main" val="0"/>
+                          </a:ext>
+                        </a:extLst>
+                      </a:blip>
+                      <a:srcRect/>
+                      <a:tile tx="0" ty="0" sx="100000" sy="100000" flip="none" algn="ctr"/>
+                    </a:blipFill>
+                  </a:tcPr>
+                </a:tc>
+                <a:tc>
+                  <a:txBody>
+                    <a:bodyPr/>
+                    <a:lstStyle/>
+                    <a:p>
+                      <a:r>
+                        <a:rPr lang="en-US" dirty="0" smtClean="0">
+                          <a:solidFill>
+                            <a:schemeClr val="accent4">
+                              <a:lumMod val="75000"/>
+                            </a:schemeClr>
+                          </a:solidFill>
+                        </a:rPr>
+                        <a:t>About</a:t>
+                      </a:r>
+                      <a:endParaRPr lang="en-US" dirty="0">
+                        <a:solidFill>
+                          <a:schemeClr val="accent4">
+                            <a:lumMod val="75000"/>
+                          </a:schemeClr>
+                        </a:solidFill>
+                      </a:endParaRPr>
+                    </a:p>
+                  </a:txBody>
+                  <a:tcPr>
+                    <a:blipFill dpi="0" rotWithShape="1">
+                      <a:blip r:embed="rId2">
+                        <a:extLst>
+                          <a:ext uri="{28A0092B-C50C-407E-A947-70E740481C1C}">
+                            <a14:useLocalDpi xmlns:a14="http://schemas.microsoft.com/office/drawing/2010/main" val="0"/>
+                          </a:ext>
+                        </a:extLst>
+                      </a:blip>
+                      <a:srcRect/>
+                      <a:tile tx="0" ty="0" sx="100000" sy="100000" flip="none" algn="ctr"/>
+                    </a:blipFill>
+                  </a:tcPr>
+                </a:tc>
+              </a:tr>
+            </a:tbl>
+          </a:graphicData>
+        </a:graphic>
+      </p:graphicFrame>
+      <p:sp>
+        <p:nvSpPr>
+          <p:cNvPr id="6" name="TextBox 5"/>
+          <p:cNvSpPr txBox="1"/>
+          <p:nvPr/>
+        </p:nvSpPr>
+        <p:spPr>
+          <a:xfrm>
+            <a:off x="1265955" y="1095379"/>
+            <a:ext cx="6190719" cy="4801314"/>
+          </a:xfrm>
+          <a:prstGeom prst="rect">
+            <a:avLst/>
+          </a:prstGeom>
+          <a:noFill/>
+        </p:spPr>
+        <p:style>
+          <a:lnRef idx="2">
+            <a:schemeClr val="dk1"/>
+          </a:lnRef>
+          <a:fillRef idx="1">
+            <a:schemeClr val="lt1"/>
+          </a:fillRef>
+          <a:effectRef idx="0">
+            <a:schemeClr val="dk1"/>
+          </a:effectRef>
+          <a:fontRef idx="minor">
+            <a:schemeClr val="dk1"/>
+          </a:fontRef>
+        </p:style>
+        <p:txBody>
+          <a:bodyPr wrap="square" rtlCol="0">
+            <a:spAutoFit/>
+          </a:bodyPr>
+          <a:lstStyle/>
+          <a:p>
+            <a:r>
+              <a:rPr lang="en-US" dirty="0" smtClean="0"/>
+              <a:t>Blog Post 1</a:t>
+            </a:r>
+          </a:p>
+          <a:p>
+            <a:endParaRPr lang="en-US" dirty="0" smtClean="0"/>
+          </a:p>
+          <a:p>
+            <a:r>
+              <a:rPr lang="en-US" dirty="0"/>
+              <a:t>Lorem ipsum dolor sit </a:t>
+            </a:r>
+            <a:r>
+              <a:rPr lang="en-US" dirty="0" err="1"/>
+              <a:t>amet</a:t>
+            </a:r>
+            <a:r>
+              <a:rPr lang="en-US" dirty="0"/>
+              <a:t>, </a:t>
+            </a:r>
+            <a:r>
+              <a:rPr lang="en-US" dirty="0" err="1"/>
+              <a:t>consectetur</a:t>
+            </a:r>
+            <a:r>
+              <a:rPr lang="en-US" dirty="0"/>
+              <a:t> </a:t>
+            </a:r>
+            <a:r>
+              <a:rPr lang="en-US" dirty="0" err="1"/>
+              <a:t>adipiscing</a:t>
+            </a:r>
+            <a:r>
+              <a:rPr lang="en-US" dirty="0"/>
+              <a:t> </a:t>
+            </a:r>
+            <a:r>
+              <a:rPr lang="en-US" dirty="0" err="1"/>
+              <a:t>elit</a:t>
+            </a:r>
+            <a:r>
+              <a:rPr lang="en-US" dirty="0"/>
+              <a:t>, </a:t>
+            </a:r>
+            <a:r>
+              <a:rPr lang="en-US" dirty="0" err="1"/>
+              <a:t>sed</a:t>
+            </a:r>
+            <a:r>
+              <a:rPr lang="en-US" dirty="0"/>
+              <a:t> do </a:t>
+            </a:r>
+            <a:r>
+              <a:rPr lang="en-US" dirty="0" err="1"/>
+              <a:t>eiusmod</a:t>
+            </a:r>
+            <a:r>
+              <a:rPr lang="en-US" dirty="0"/>
+              <a:t> </a:t>
+            </a:r>
+            <a:r>
+              <a:rPr lang="en-US" dirty="0" err="1"/>
+              <a:t>tempor</a:t>
+            </a:r>
+            <a:r>
+              <a:rPr lang="en-US" dirty="0"/>
+              <a:t> </a:t>
+            </a:r>
+            <a:r>
+              <a:rPr lang="en-US" dirty="0" err="1"/>
+              <a:t>incididunt</a:t>
+            </a:r>
+            <a:r>
+              <a:rPr lang="en-US" dirty="0"/>
+              <a:t> </a:t>
+            </a:r>
+            <a:r>
+              <a:rPr lang="en-US" dirty="0" err="1"/>
+              <a:t>ut</a:t>
+            </a:r>
+            <a:r>
+              <a:rPr lang="en-US" dirty="0"/>
+              <a:t> </a:t>
+            </a:r>
+            <a:r>
+              <a:rPr lang="en-US" dirty="0" err="1"/>
+              <a:t>labore</a:t>
+            </a:r>
+            <a:r>
+              <a:rPr lang="en-US" dirty="0"/>
+              <a:t> et </a:t>
+            </a:r>
+            <a:r>
+              <a:rPr lang="en-US" dirty="0" err="1"/>
+              <a:t>dolore</a:t>
+            </a:r>
+            <a:r>
+              <a:rPr lang="en-US" dirty="0"/>
+              <a:t> magna </a:t>
+            </a:r>
+            <a:r>
+              <a:rPr lang="en-US" dirty="0" err="1"/>
+              <a:t>aliqua</a:t>
+            </a:r>
+            <a:r>
+              <a:rPr lang="en-US" dirty="0"/>
+              <a:t>. </a:t>
+            </a:r>
+            <a:r>
+              <a:rPr lang="en-US" dirty="0" err="1"/>
+              <a:t>Ut</a:t>
+            </a:r>
+            <a:r>
+              <a:rPr lang="en-US" dirty="0"/>
+              <a:t> </a:t>
+            </a:r>
+            <a:r>
+              <a:rPr lang="en-US" dirty="0" err="1"/>
+              <a:t>enim</a:t>
+            </a:r>
+            <a:r>
+              <a:rPr lang="en-US" dirty="0"/>
+              <a:t> ad minim </a:t>
+            </a:r>
+            <a:r>
+              <a:rPr lang="en-US" dirty="0" err="1"/>
+              <a:t>veniam</a:t>
+            </a:r>
+            <a:r>
+              <a:rPr lang="en-US" dirty="0"/>
+              <a:t>, </a:t>
+            </a:r>
+            <a:r>
+              <a:rPr lang="en-US" dirty="0" err="1"/>
+              <a:t>quis</a:t>
+            </a:r>
+            <a:r>
+              <a:rPr lang="en-US" dirty="0"/>
+              <a:t> </a:t>
+            </a:r>
+            <a:r>
+              <a:rPr lang="en-US" dirty="0" err="1"/>
+              <a:t>nostrud</a:t>
+            </a:r>
+            <a:r>
+              <a:rPr lang="en-US" dirty="0"/>
+              <a:t> exercitation </a:t>
+            </a:r>
+            <a:r>
+              <a:rPr lang="en-US" dirty="0" err="1"/>
+              <a:t>ullamco</a:t>
+            </a:r>
+            <a:r>
+              <a:rPr lang="en-US" dirty="0"/>
+              <a:t> </a:t>
+            </a:r>
+            <a:r>
+              <a:rPr lang="en-US" dirty="0" err="1"/>
+              <a:t>laboris</a:t>
+            </a:r>
+            <a:r>
+              <a:rPr lang="en-US" dirty="0"/>
+              <a:t> nisi </a:t>
+            </a:r>
+            <a:r>
+              <a:rPr lang="en-US" dirty="0" err="1"/>
+              <a:t>ut</a:t>
+            </a:r>
+            <a:r>
+              <a:rPr lang="en-US" dirty="0"/>
+              <a:t> </a:t>
+            </a:r>
+            <a:r>
+              <a:rPr lang="en-US" dirty="0" err="1"/>
+              <a:t>aliquip</a:t>
+            </a:r>
+            <a:r>
+              <a:rPr lang="en-US" dirty="0"/>
+              <a:t> ex </a:t>
+            </a:r>
+            <a:r>
+              <a:rPr lang="en-US" dirty="0" err="1" smtClean="0"/>
+              <a:t>nulla</a:t>
+            </a:r>
+            <a:r>
+              <a:rPr lang="en-US" dirty="0" smtClean="0"/>
+              <a:t> </a:t>
+            </a:r>
+            <a:r>
+              <a:rPr lang="en-US" dirty="0" err="1"/>
+              <a:t>pariatur</a:t>
+            </a:r>
+            <a:r>
+              <a:rPr lang="en-US" dirty="0"/>
+              <a:t>. </a:t>
+            </a:r>
+            <a:r>
+              <a:rPr lang="en-US" dirty="0" err="1"/>
+              <a:t>Excepteur</a:t>
+            </a:r>
+            <a:r>
+              <a:rPr lang="en-US" dirty="0"/>
+              <a:t> </a:t>
+            </a:r>
+            <a:r>
+              <a:rPr lang="en-US" dirty="0" err="1"/>
+              <a:t>sint</a:t>
+            </a:r>
+            <a:r>
+              <a:rPr lang="en-US" dirty="0"/>
+              <a:t> </a:t>
+            </a:r>
+            <a:r>
+              <a:rPr lang="en-US" dirty="0" err="1"/>
+              <a:t>occaecat</a:t>
+            </a:r>
+            <a:r>
+              <a:rPr lang="en-US" dirty="0"/>
+              <a:t> </a:t>
+            </a:r>
+            <a:r>
+              <a:rPr lang="en-US" dirty="0" err="1"/>
+              <a:t>cupidatat</a:t>
+            </a:r>
+            <a:r>
+              <a:rPr lang="en-US" dirty="0"/>
+              <a:t> non </a:t>
+            </a:r>
+            <a:r>
+              <a:rPr lang="en-US" dirty="0" err="1"/>
+              <a:t>proident</a:t>
+            </a:r>
+            <a:r>
+              <a:rPr lang="en-US" dirty="0"/>
+              <a:t>, </a:t>
+            </a:r>
+            <a:r>
+              <a:rPr lang="en-US" dirty="0" err="1"/>
+              <a:t>sunt</a:t>
+            </a:r>
+            <a:r>
+              <a:rPr lang="en-US" dirty="0"/>
+              <a:t> in culpa qui </a:t>
+            </a:r>
+            <a:r>
+              <a:rPr lang="en-US" dirty="0" err="1"/>
+              <a:t>officia</a:t>
+            </a:r>
+            <a:r>
+              <a:rPr lang="en-US" dirty="0"/>
+              <a:t> </a:t>
+            </a:r>
+            <a:r>
+              <a:rPr lang="en-US" dirty="0" err="1"/>
+              <a:t>deserunt</a:t>
+            </a:r>
+            <a:r>
+              <a:rPr lang="en-US" dirty="0"/>
+              <a:t> </a:t>
+            </a:r>
+            <a:r>
+              <a:rPr lang="en-US" dirty="0" err="1"/>
+              <a:t>mollit</a:t>
+            </a:r>
+            <a:r>
+              <a:rPr lang="en-US" dirty="0"/>
+              <a:t> </a:t>
+            </a:r>
+            <a:r>
+              <a:rPr lang="en-US" dirty="0" err="1"/>
+              <a:t>anim</a:t>
+            </a:r>
+            <a:r>
+              <a:rPr lang="en-US" dirty="0"/>
+              <a:t> id </a:t>
+            </a:r>
+            <a:r>
+              <a:rPr lang="en-US" dirty="0" err="1"/>
+              <a:t>est</a:t>
+            </a:r>
+            <a:r>
+              <a:rPr lang="en-US" dirty="0"/>
+              <a:t> </a:t>
+            </a:r>
+            <a:r>
+              <a:rPr lang="en-US" dirty="0" err="1"/>
+              <a:t>laborum</a:t>
+            </a:r>
+            <a:r>
+              <a:rPr lang="en-US" dirty="0" smtClean="0"/>
+              <a:t>.</a:t>
+            </a:r>
+          </a:p>
+          <a:p>
+            <a:endParaRPr lang="en-US" dirty="0"/>
+          </a:p>
+          <a:p>
+            <a:r>
+              <a:rPr lang="en-US" dirty="0" smtClean="0"/>
+              <a:t>Blog Post 2</a:t>
+            </a:r>
+          </a:p>
+          <a:p>
+            <a:endParaRPr lang="en-US" dirty="0" smtClean="0"/>
+          </a:p>
+          <a:p>
+            <a:r>
+              <a:rPr lang="en-US" dirty="0"/>
+              <a:t>Lorem ipsum dolor sit </a:t>
+            </a:r>
+            <a:r>
+              <a:rPr lang="en-US" dirty="0" err="1"/>
+              <a:t>amet</a:t>
+            </a:r>
+            <a:r>
+              <a:rPr lang="en-US" dirty="0"/>
+              <a:t>, </a:t>
+            </a:r>
+            <a:r>
+              <a:rPr lang="en-US" dirty="0" err="1"/>
+              <a:t>consectetur</a:t>
+            </a:r>
+            <a:r>
+              <a:rPr lang="en-US" dirty="0"/>
+              <a:t> </a:t>
+            </a:r>
+            <a:r>
+              <a:rPr lang="en-US" dirty="0" err="1"/>
+              <a:t>adipiscing</a:t>
+            </a:r>
+            <a:r>
+              <a:rPr lang="en-US" dirty="0"/>
+              <a:t> </a:t>
+            </a:r>
+            <a:r>
+              <a:rPr lang="en-US" dirty="0" err="1"/>
+              <a:t>elit</a:t>
+            </a:r>
+            <a:r>
+              <a:rPr lang="en-US" dirty="0"/>
+              <a:t>, </a:t>
+            </a:r>
+            <a:r>
+              <a:rPr lang="en-US" dirty="0" err="1"/>
+              <a:t>sed</a:t>
+            </a:r>
+            <a:r>
+              <a:rPr lang="en-US" dirty="0"/>
+              <a:t> do </a:t>
+            </a:r>
+            <a:r>
+              <a:rPr lang="en-US" dirty="0" err="1"/>
+              <a:t>eiusmod</a:t>
+            </a:r>
+            <a:r>
+              <a:rPr lang="en-US" dirty="0"/>
+              <a:t> </a:t>
+            </a:r>
+            <a:r>
+              <a:rPr lang="en-US" dirty="0" err="1"/>
+              <a:t>tempor</a:t>
+            </a:r>
+            <a:r>
+              <a:rPr lang="en-US" dirty="0"/>
+              <a:t> </a:t>
+            </a:r>
+            <a:r>
+              <a:rPr lang="en-US" dirty="0" err="1"/>
+              <a:t>incididunt</a:t>
+            </a:r>
+            <a:r>
+              <a:rPr lang="en-US" dirty="0"/>
+              <a:t> </a:t>
+            </a:r>
+            <a:r>
+              <a:rPr lang="en-US" dirty="0" err="1"/>
+              <a:t>ut</a:t>
+            </a:r>
+            <a:r>
+              <a:rPr lang="en-US" dirty="0"/>
+              <a:t> </a:t>
+            </a:r>
+            <a:r>
+              <a:rPr lang="en-US" dirty="0" err="1"/>
+              <a:t>labore</a:t>
+            </a:r>
+            <a:r>
+              <a:rPr lang="en-US" dirty="0"/>
+              <a:t> et </a:t>
+            </a:r>
+            <a:r>
+              <a:rPr lang="en-US" dirty="0" err="1"/>
+              <a:t>dolore</a:t>
+            </a:r>
+            <a:r>
+              <a:rPr lang="en-US" dirty="0"/>
+              <a:t> magna </a:t>
+            </a:r>
+            <a:r>
+              <a:rPr lang="en-US" dirty="0" err="1"/>
+              <a:t>aliqua</a:t>
+            </a:r>
+            <a:r>
+              <a:rPr lang="en-US" dirty="0"/>
+              <a:t>. </a:t>
+            </a:r>
+            <a:r>
+              <a:rPr lang="en-US" dirty="0" err="1"/>
+              <a:t>Ut</a:t>
+            </a:r>
+            <a:r>
+              <a:rPr lang="en-US" dirty="0"/>
+              <a:t> </a:t>
+            </a:r>
+            <a:r>
+              <a:rPr lang="en-US" dirty="0" err="1"/>
+              <a:t>enim</a:t>
+            </a:r>
+            <a:r>
+              <a:rPr lang="en-US" dirty="0"/>
+              <a:t> ad minim </a:t>
+            </a:r>
+            <a:r>
+              <a:rPr lang="en-US" dirty="0" err="1"/>
+              <a:t>veniam</a:t>
+            </a:r>
+            <a:r>
+              <a:rPr lang="en-US" dirty="0"/>
+              <a:t>, </a:t>
+            </a:r>
+            <a:r>
+              <a:rPr lang="en-US" dirty="0" err="1"/>
+              <a:t>quis</a:t>
+            </a:r>
+            <a:r>
+              <a:rPr lang="en-US" dirty="0"/>
+              <a:t> </a:t>
+            </a:r>
+            <a:r>
+              <a:rPr lang="en-US" dirty="0" err="1"/>
+              <a:t>nostrud</a:t>
+            </a:r>
+            <a:r>
+              <a:rPr lang="en-US" dirty="0"/>
+              <a:t> exercitation </a:t>
+            </a:r>
+            <a:r>
+              <a:rPr lang="en-US" dirty="0" err="1"/>
+              <a:t>ullamco</a:t>
+            </a:r>
+            <a:r>
+              <a:rPr lang="en-US" dirty="0"/>
+              <a:t> </a:t>
+            </a:r>
+            <a:r>
+              <a:rPr lang="en-US" dirty="0" err="1"/>
+              <a:t>laboris</a:t>
+            </a:r>
+            <a:r>
+              <a:rPr lang="en-US" dirty="0"/>
+              <a:t> nisi </a:t>
+            </a:r>
+            <a:r>
+              <a:rPr lang="en-US" dirty="0" err="1"/>
+              <a:t>ut</a:t>
+            </a:r>
+            <a:r>
+              <a:rPr lang="en-US" dirty="0"/>
+              <a:t> </a:t>
+            </a:r>
+            <a:r>
+              <a:rPr lang="en-US" dirty="0" err="1"/>
+              <a:t>aliquip</a:t>
+            </a:r>
+            <a:r>
+              <a:rPr lang="en-US" dirty="0"/>
+              <a:t> ex </a:t>
+            </a:r>
+            <a:r>
+              <a:rPr lang="en-US" dirty="0" err="1"/>
+              <a:t>ea</a:t>
+            </a:r>
+            <a:r>
+              <a:rPr lang="en-US" dirty="0"/>
+              <a:t> </a:t>
+            </a:r>
+            <a:r>
+              <a:rPr lang="en-US" dirty="0" err="1"/>
+              <a:t>commodo</a:t>
+            </a:r>
+            <a:r>
+              <a:rPr lang="en-US" dirty="0"/>
+              <a:t> </a:t>
+            </a:r>
+            <a:r>
+              <a:rPr lang="en-US" dirty="0" err="1"/>
+              <a:t>consequat</a:t>
+            </a:r>
+            <a:r>
+              <a:rPr lang="en-US" dirty="0"/>
+              <a:t>. </a:t>
+            </a:r>
+            <a:r>
+              <a:rPr lang="en-US" dirty="0" err="1"/>
+              <a:t>Duis</a:t>
+            </a:r>
+            <a:r>
+              <a:rPr lang="en-US" dirty="0"/>
+              <a:t> </a:t>
+            </a:r>
+            <a:r>
+              <a:rPr lang="en-US" dirty="0" err="1"/>
+              <a:t>aute</a:t>
+            </a:r>
+            <a:r>
+              <a:rPr lang="en-US" dirty="0"/>
+              <a:t> </a:t>
+            </a:r>
+            <a:r>
+              <a:rPr lang="en-US" dirty="0" err="1"/>
+              <a:t>irure</a:t>
+            </a:r>
+            <a:r>
+              <a:rPr lang="en-US" dirty="0"/>
+              <a:t> dolor in </a:t>
+            </a:r>
+            <a:r>
+              <a:rPr lang="en-US" dirty="0" err="1"/>
+              <a:t>reprehenderit</a:t>
+            </a:r>
+            <a:r>
+              <a:rPr lang="en-US" dirty="0"/>
+              <a:t> in </a:t>
+            </a:r>
+            <a:r>
+              <a:rPr lang="en-US" dirty="0" err="1"/>
+              <a:t>voluptate</a:t>
+            </a:r>
+            <a:r>
+              <a:rPr lang="en-US" dirty="0"/>
+              <a:t> </a:t>
+            </a:r>
+            <a:r>
+              <a:rPr lang="en-US" dirty="0" err="1"/>
+              <a:t>velit</a:t>
+            </a:r>
+            <a:r>
+              <a:rPr lang="en-US" dirty="0"/>
+              <a:t> </a:t>
+            </a:r>
+            <a:r>
+              <a:rPr lang="en-US" dirty="0" err="1"/>
+              <a:t>esse</a:t>
+            </a:r>
+            <a:r>
+              <a:rPr lang="en-US" dirty="0"/>
+              <a:t> </a:t>
+            </a:r>
+            <a:r>
+              <a:rPr lang="en-US" dirty="0" err="1"/>
+              <a:t>cillum</a:t>
+            </a:r>
+            <a:r>
+              <a:rPr lang="en-US" dirty="0"/>
+              <a:t> </a:t>
+            </a:r>
+            <a:r>
+              <a:rPr lang="en-US" dirty="0" err="1"/>
+              <a:t>dolore</a:t>
+            </a:r>
+            <a:r>
+              <a:rPr lang="en-US" dirty="0"/>
+              <a:t> </a:t>
+            </a:r>
+            <a:r>
+              <a:rPr lang="en-US" dirty="0" err="1"/>
+              <a:t>eu</a:t>
+            </a:r>
+            <a:r>
+              <a:rPr lang="en-US" dirty="0"/>
+              <a:t> </a:t>
+            </a:r>
+            <a:r>
+              <a:rPr lang="en-US" dirty="0" err="1"/>
+              <a:t>fugiat</a:t>
+            </a:r>
+            <a:r>
+              <a:rPr lang="en-US" dirty="0"/>
+              <a:t> </a:t>
+            </a:r>
+            <a:r>
+              <a:rPr lang="en-US" dirty="0" err="1"/>
+              <a:t>nulla</a:t>
+            </a:r>
+            <a:r>
+              <a:rPr lang="en-US" dirty="0"/>
+              <a:t> </a:t>
+            </a:r>
+            <a:r>
+              <a:rPr lang="en-US" dirty="0" err="1"/>
+              <a:t>pariatur</a:t>
+            </a:r>
+            <a:r>
+              <a:rPr lang="en-US" dirty="0"/>
+              <a:t>. </a:t>
+            </a:r>
+          </a:p>
+        </p:txBody>
+      </p:sp>
+      <p:sp>
+        <p:nvSpPr>
+          <p:cNvPr id="7" name="TextBox 6"/>
+          <p:cNvSpPr txBox="1"/>
+          <p:nvPr/>
+        </p:nvSpPr>
+        <p:spPr>
+          <a:xfrm>
+            <a:off x="8012624" y="1095379"/>
+            <a:ext cx="2468773" cy="2862322"/>
+          </a:xfrm>
+          <a:prstGeom prst="rect">
+            <a:avLst/>
+          </a:prstGeom>
+          <a:noFill/>
+          <a:ln>
+            <a:solidFill>
+              <a:schemeClr val="dk1"/>
+            </a:solidFill>
+          </a:ln>
+        </p:spPr>
+        <p:txBody>
+          <a:bodyPr wrap="square" rtlCol="0">
+            <a:spAutoFit/>
+          </a:bodyPr>
+          <a:lstStyle/>
+          <a:p>
+            <a:r>
+              <a:rPr lang="en-US" dirty="0" smtClean="0"/>
+              <a:t>Upcoming Events</a:t>
+            </a:r>
+          </a:p>
+          <a:p>
+            <a:pPr marL="285750" indent="-285750">
+              <a:buFontTx/>
+              <a:buChar char="-"/>
+            </a:pPr>
+            <a:r>
+              <a:rPr lang="en-US" dirty="0" smtClean="0"/>
+              <a:t>Event 1</a:t>
+            </a:r>
+          </a:p>
+          <a:p>
+            <a:pPr marL="742950" lvl="1" indent="-285750">
+              <a:buFontTx/>
+              <a:buChar char="-"/>
+            </a:pPr>
+            <a:r>
+              <a:rPr lang="en-US" dirty="0" smtClean="0"/>
+              <a:t>Date</a:t>
+            </a:r>
+          </a:p>
+          <a:p>
+            <a:pPr marL="742950" lvl="1" indent="-285750">
+              <a:buFontTx/>
+              <a:buChar char="-"/>
+            </a:pPr>
+            <a:r>
+              <a:rPr lang="en-US" dirty="0" smtClean="0"/>
+              <a:t>Location</a:t>
+            </a:r>
+          </a:p>
+          <a:p>
+            <a:pPr marL="742950" lvl="1" indent="-285750">
+              <a:buFontTx/>
+              <a:buChar char="-"/>
+            </a:pPr>
+            <a:r>
+              <a:rPr lang="en-US" dirty="0" smtClean="0"/>
+              <a:t>Website</a:t>
+            </a:r>
+          </a:p>
+          <a:p>
+            <a:pPr marL="285750" indent="-285750">
+              <a:buFontTx/>
+              <a:buChar char="-"/>
+            </a:pPr>
+            <a:r>
+              <a:rPr lang="en-US" dirty="0" smtClean="0"/>
+              <a:t>Event 2</a:t>
+            </a:r>
+          </a:p>
+          <a:p>
+            <a:pPr marL="742950" lvl="1" indent="-285750">
+              <a:buFontTx/>
+              <a:buChar char="-"/>
+            </a:pPr>
+            <a:r>
+              <a:rPr lang="en-US" dirty="0"/>
+              <a:t>Date</a:t>
+            </a:r>
+          </a:p>
+          <a:p>
+            <a:pPr marL="742950" lvl="1" indent="-285750">
+              <a:buFontTx/>
+              <a:buChar char="-"/>
+            </a:pPr>
+            <a:r>
+              <a:rPr lang="en-US" dirty="0"/>
+              <a:t>Location</a:t>
+            </a:r>
+          </a:p>
+          <a:p>
+            <a:pPr marL="742950" lvl="1" indent="-285750">
+              <a:buFontTx/>
+              <a:buChar char="-"/>
+            </a:pPr>
+            <a:r>
+              <a:rPr lang="en-US" dirty="0" smtClean="0"/>
+              <a:t>Website</a:t>
+            </a:r>
+          </a:p>
+          <a:p>
+            <a:pPr marL="742950" lvl="1" indent="-285750">
+              <a:buFontTx/>
+              <a:buChar char="-"/>
+            </a:pPr>
+            <a:endParaRPr lang="en-US" dirty="0"/>
           </a:p>
         </p:txBody>
       </p:sp>

</xml_diff>

<commit_message>
forgot to commit changes made last week
</commit_message>
<xml_diff>
--- a/wireframe template.pptx
+++ b/wireframe template.pptx
@@ -243,7 +243,7 @@
           <a:p>
             <a:fld id="{E2359063-678B-E748-A5AF-17ABF0037239}" type="datetimeFigureOut">
               <a:rPr lang="en-US" smtClean="0"/>
-              <a:t>4/30/17</a:t>
+              <a:t>5/7/17</a:t>
             </a:fld>
             <a:endParaRPr lang="en-US"/>
           </a:p>
@@ -413,7 +413,7 @@
           <a:p>
             <a:fld id="{E2359063-678B-E748-A5AF-17ABF0037239}" type="datetimeFigureOut">
               <a:rPr lang="en-US" smtClean="0"/>
-              <a:t>4/30/17</a:t>
+              <a:t>5/7/17</a:t>
             </a:fld>
             <a:endParaRPr lang="en-US"/>
           </a:p>
@@ -593,7 +593,7 @@
           <a:p>
             <a:fld id="{E2359063-678B-E748-A5AF-17ABF0037239}" type="datetimeFigureOut">
               <a:rPr lang="en-US" smtClean="0"/>
-              <a:t>4/30/17</a:t>
+              <a:t>5/7/17</a:t>
             </a:fld>
             <a:endParaRPr lang="en-US"/>
           </a:p>
@@ -763,7 +763,7 @@
           <a:p>
             <a:fld id="{E2359063-678B-E748-A5AF-17ABF0037239}" type="datetimeFigureOut">
               <a:rPr lang="en-US" smtClean="0"/>
-              <a:t>4/30/17</a:t>
+              <a:t>5/7/17</a:t>
             </a:fld>
             <a:endParaRPr lang="en-US"/>
           </a:p>
@@ -1009,7 +1009,7 @@
           <a:p>
             <a:fld id="{E2359063-678B-E748-A5AF-17ABF0037239}" type="datetimeFigureOut">
               <a:rPr lang="en-US" smtClean="0"/>
-              <a:t>4/30/17</a:t>
+              <a:t>5/7/17</a:t>
             </a:fld>
             <a:endParaRPr lang="en-US"/>
           </a:p>
@@ -1241,7 +1241,7 @@
           <a:p>
             <a:fld id="{E2359063-678B-E748-A5AF-17ABF0037239}" type="datetimeFigureOut">
               <a:rPr lang="en-US" smtClean="0"/>
-              <a:t>4/30/17</a:t>
+              <a:t>5/7/17</a:t>
             </a:fld>
             <a:endParaRPr lang="en-US"/>
           </a:p>
@@ -1608,7 +1608,7 @@
           <a:p>
             <a:fld id="{E2359063-678B-E748-A5AF-17ABF0037239}" type="datetimeFigureOut">
               <a:rPr lang="en-US" smtClean="0"/>
-              <a:t>4/30/17</a:t>
+              <a:t>5/7/17</a:t>
             </a:fld>
             <a:endParaRPr lang="en-US"/>
           </a:p>
@@ -1726,7 +1726,7 @@
           <a:p>
             <a:fld id="{E2359063-678B-E748-A5AF-17ABF0037239}" type="datetimeFigureOut">
               <a:rPr lang="en-US" smtClean="0"/>
-              <a:t>4/30/17</a:t>
+              <a:t>5/7/17</a:t>
             </a:fld>
             <a:endParaRPr lang="en-US"/>
           </a:p>
@@ -1821,7 +1821,7 @@
           <a:p>
             <a:fld id="{E2359063-678B-E748-A5AF-17ABF0037239}" type="datetimeFigureOut">
               <a:rPr lang="en-US" smtClean="0"/>
-              <a:t>4/30/17</a:t>
+              <a:t>5/7/17</a:t>
             </a:fld>
             <a:endParaRPr lang="en-US"/>
           </a:p>
@@ -2098,7 +2098,7 @@
           <a:p>
             <a:fld id="{E2359063-678B-E748-A5AF-17ABF0037239}" type="datetimeFigureOut">
               <a:rPr lang="en-US" smtClean="0"/>
-              <a:t>4/30/17</a:t>
+              <a:t>5/7/17</a:t>
             </a:fld>
             <a:endParaRPr lang="en-US"/>
           </a:p>
@@ -2351,7 +2351,7 @@
           <a:p>
             <a:fld id="{E2359063-678B-E748-A5AF-17ABF0037239}" type="datetimeFigureOut">
               <a:rPr lang="en-US" smtClean="0"/>
-              <a:t>4/30/17</a:t>
+              <a:t>5/7/17</a:t>
             </a:fld>
             <a:endParaRPr lang="en-US"/>
           </a:p>
@@ -2564,7 +2564,7 @@
           <a:p>
             <a:fld id="{E2359063-678B-E748-A5AF-17ABF0037239}" type="datetimeFigureOut">
               <a:rPr lang="en-US" smtClean="0"/>
-              <a:t>4/30/17</a:t>
+              <a:t>5/7/17</a:t>
             </a:fld>
             <a:endParaRPr lang="en-US"/>
           </a:p>

</xml_diff>